<commit_message>
visual_studio2013_tensorflow/설치 방법.pptx 파일 수정
</commit_message>
<xml_diff>
--- a/visual_studio2013_tensorflow/설치 방법.pptx
+++ b/visual_studio2013_tensorflow/설치 방법.pptx
@@ -2,7 +2,7 @@
 <file path=ppt/presentation.xml><?xml version="1.0" encoding="utf-8"?>
 <p:presentation xmlns:a="http://schemas.openxmlformats.org/drawingml/2006/main" xmlns:r="http://schemas.openxmlformats.org/officeDocument/2006/relationships" xmlns:p="http://schemas.openxmlformats.org/presentationml/2006/main" xmlns:p14="http://schemas.microsoft.com/office/powerpoint/2010/main" saveSubsetFonts="1">
   <p:sldMasterIdLst>
-    <p:sldMasterId id="2147483764" r:id="rId13"/>
+    <p:sldMasterId id="2147483766" r:id="rId13"/>
   </p:sldMasterIdLst>
   <p:sldIdLst>
     <p:sldId id="256" r:id="rId15"/>
@@ -7578,7 +7578,7 @@
         <p:spPr>
           <a:xfrm>
             <a:off x="609600" y="1600200"/>
-            <a:ext cx="10974705" cy="4528185"/>
+            <a:ext cx="10975340" cy="4528820"/>
           </a:xfrm>
           <a:prstGeom prst="rect"/>
         </p:spPr>
@@ -7623,7 +7623,7 @@
             </a:endParaRPr>
           </a:p>
           <a:p>
-            <a:pPr marL="685800" indent="-228600" algn="l" fontAlgn="auto" defTabSz="508000" eaLnBrk="0" lvl="1">
+            <a:pPr marL="685800" indent="-228600" algn="l" fontAlgn="auto" defTabSz="508000" eaLnBrk="0">
               <a:lnSpc>
                 <a:spcPct val="90000"/>
               </a:lnSpc>
@@ -7647,7 +7647,7 @@
                 <a:latin typeface="맑은 고딕" charset="0"/>
                 <a:ea typeface="맑은 고딕" charset="0"/>
               </a:rPr>
-              <a:t>기본값으로 설정</a:t>
+              <a:t>Visual studio 기본 설정으로 설정</a:t>
             </a:r>
             <a:endParaRPr lang="ko-KR" altLang="en-US" sz="2800" cap="none" dirty="0" smtClean="0" b="0" strike="noStrike">
               <a:solidFill>
@@ -7658,7 +7658,7 @@
             </a:endParaRPr>
           </a:p>
           <a:p>
-            <a:pPr marL="685800" indent="-228600" algn="l" fontAlgn="auto" defTabSz="508000" eaLnBrk="0" lvl="1">
+            <a:pPr marL="685800" indent="-228600" algn="l" fontAlgn="auto" defTabSz="508000" eaLnBrk="0">
               <a:lnSpc>
                 <a:spcPct val="90000"/>
               </a:lnSpc>
@@ -7696,7 +7696,7 @@
       </p:sp>
       <p:pic>
         <p:nvPicPr>
-          <p:cNvPr id="4" name="그림 3" descr="C:/Users/Wonyoungha/AppData/Roaming/PolarisOffice/ETemp/8492_11290184/fImage164341955724.png"/>
+          <p:cNvPr id="4" name="그림 3"/>
           <p:cNvPicPr>
             <a:picLocks noChangeAspect="1"/>
           </p:cNvPicPr>
@@ -11228,19 +11228,19 @@
           </p:nvPr>
         </p:nvSpPr>
         <p:spPr>
-          <a:xfrm rot="0">
+          <a:xfrm>
             <a:off x="609600" y="1600200"/>
-            <a:ext cx="10973435" cy="4526915"/>
+            <a:ext cx="10974070" cy="4527550"/>
           </a:xfrm>
           <a:prstGeom prst="rect"/>
         </p:spPr>
         <p:txBody>
-          <a:bodyPr wrap="square" lIns="91440" tIns="45720" rIns="91440" bIns="45720" vert="horz" anchor="t">
+          <a:bodyPr wrap="square" lIns="91440" tIns="45720" rIns="91440" bIns="45720" numCol="1" vert="horz" anchor="t">
             <a:normAutofit fontScale="100000" lnSpcReduction="0"/>
           </a:bodyPr>
           <a:lstStyle/>
           <a:p>
-            <a:pPr marL="228600" indent="-228600" algn="l" fontAlgn="auto" defTabSz="508000">
+            <a:pPr marL="228600" indent="-228600" algn="l" fontAlgn="auto" defTabSz="508000" eaLnBrk="0">
               <a:lnSpc>
                 <a:spcPct val="90000"/>
               </a:lnSpc>
@@ -11250,6 +11250,9 @@
               <a:spcAft>
                 <a:spcPts val="0"/>
               </a:spcAft>
+              <a:buClr>
+                <a:srgbClr val="000000"/>
+              </a:buClr>
               <a:buFont typeface="맑은 고딕"/>
               <a:buChar char="•"/>
             </a:pPr>
@@ -11261,7 +11264,7 @@
                 <a:latin typeface="맑은 고딕" charset="0"/>
                 <a:ea typeface="맑은 고딕" charset="0"/>
               </a:rPr>
-              <a:t>ptvs를 설치하지 않으면 python 프로젝트를 만들 수 없다</a:t>
+              <a:t>ptvs를 설치하지 않으면 python3 프로젝트를 만들 수 없다</a:t>
             </a:r>
             <a:endParaRPr lang="ko-KR" altLang="en-US" sz="2800" cap="none" dirty="0" smtClean="0" b="0" strike="noStrike">
               <a:solidFill>
@@ -11275,7 +11278,7 @@
       </p:sp>
       <p:pic>
         <p:nvPicPr>
-          <p:cNvPr id="4" name="그림 3"/>
+          <p:cNvPr id="4" name="그림 3" descr="C:/Users/Wonyoungha/AppData/Roaming/PolarisOffice/ETemp/6680_46362848/fImage97656868467.png"/>
           <p:cNvPicPr>
             <a:picLocks noChangeAspect="1"/>
           </p:cNvPicPr>
@@ -11289,14 +11292,15 @@
               </a:ext>
             </a:extLst>
           </a:blip>
+          <a:srcRect/>
           <a:stretch>
             <a:fillRect/>
           </a:stretch>
         </p:blipFill>
         <p:spPr>
           <a:xfrm rot="0">
-            <a:off x="2062480" y="2205990"/>
-            <a:ext cx="8058150" cy="4525645"/>
+            <a:off x="2073275" y="2332990"/>
+            <a:ext cx="8058785" cy="4526280"/>
           </a:xfrm>
           <a:prstGeom prst="rect"/>
           <a:noFill/>

</xml_diff>